<commit_message>
Added new intro and conclusion slides
</commit_message>
<xml_diff>
--- a/archer/Conclusion.pptx
+++ b/archer/Conclusion.pptx
@@ -238,7 +238,7 @@
           <a:p>
             <a:fld id="{3724E0C8-CEB3-4512-94BB-DFCE9513899D}" type="datetimeFigureOut">
               <a:rPr lang="en-GB" smtClean="0"/>
-              <a:t>13/11/2014</a:t>
+              <a:t>27/11/2014</a:t>
             </a:fld>
             <a:endParaRPr lang="en-GB"/>
           </a:p>
@@ -403,7 +403,7 @@
           <a:p>
             <a:fld id="{2FB04699-2E7A-DC4A-A93D-A72983F9537E}" type="datetimeFigureOut">
               <a:rPr lang="en-US" smtClean="0"/>
-              <a:t>11/13/2014</a:t>
+              <a:t>11/27/2014</a:t>
             </a:fld>
             <a:endParaRPr lang="en-US"/>
           </a:p>
@@ -1076,17 +1076,8 @@
               <a:rPr lang="en-GB" altLang="en-US" dirty="0" smtClean="0">
                 <a:latin typeface="Times New Roman" pitchFamily="18" charset="0"/>
               </a:rPr>
-              <a:t>“Scientists spend an increasing amount of time building and using software. However, most scientists are never taught how to do this efficiently. As a result, many are unaware of tools and practices that would allow them to write more reliable and maintainable code with less effort. We describe a set of best practices for scientific software development that have solid foundations in research and experience, and that improve scientists' productivity and the reliability of their software</a:t>
-            </a:r>
-            <a:r>
-              <a:rPr lang="en-GB" altLang="en-US" dirty="0" smtClean="0">
-                <a:latin typeface="Times New Roman" pitchFamily="18" charset="0"/>
-              </a:rPr>
-              <a:t>.”</a:t>
-            </a:r>
-            <a:endParaRPr lang="en-GB" altLang="en-US" dirty="0" smtClean="0">
-              <a:latin typeface="Times New Roman" pitchFamily="18" charset="0"/>
-            </a:endParaRPr>
+              <a:t>“Scientists spend an increasing amount of time building and using software. However, most scientists are never taught how to do this efficiently. As a result, many are unaware of tools and practices that would allow them to write more reliable and maintainable code with less effort. We describe a set of best practices for scientific software development that have solid foundations in research and experience, and that improve scientists' productivity and the reliability of their software.”</a:t>
+            </a:r>
           </a:p>
         </p:txBody>
       </p:sp>
@@ -1925,7 +1916,7 @@
           <a:p>
             <a:fld id="{3E8CEB70-C80E-1048-86BD-76ABBAA6B3F4}" type="datetimeFigureOut">
               <a:rPr lang="en-US" smtClean="0"/>
-              <a:t>11/13/2014</a:t>
+              <a:t>11/27/2014</a:t>
             </a:fld>
             <a:endParaRPr lang="en-US"/>
           </a:p>
@@ -2095,7 +2086,7 @@
           <a:p>
             <a:fld id="{3E8CEB70-C80E-1048-86BD-76ABBAA6B3F4}" type="datetimeFigureOut">
               <a:rPr lang="en-US" smtClean="0"/>
-              <a:t>11/13/2014</a:t>
+              <a:t>11/27/2014</a:t>
             </a:fld>
             <a:endParaRPr lang="en-US"/>
           </a:p>
@@ -2275,7 +2266,7 @@
           <a:p>
             <a:fld id="{3E8CEB70-C80E-1048-86BD-76ABBAA6B3F4}" type="datetimeFigureOut">
               <a:rPr lang="en-US" smtClean="0"/>
-              <a:t>11/13/2014</a:t>
+              <a:t>11/27/2014</a:t>
             </a:fld>
             <a:endParaRPr lang="en-US"/>
           </a:p>
@@ -3400,7 +3391,7 @@
           <a:p>
             <a:fld id="{3E8CEB70-C80E-1048-86BD-76ABBAA6B3F4}" type="datetimeFigureOut">
               <a:rPr lang="en-US" smtClean="0"/>
-              <a:t>11/13/2014</a:t>
+              <a:t>11/27/2014</a:t>
             </a:fld>
             <a:endParaRPr lang="en-US"/>
           </a:p>
@@ -3646,7 +3637,7 @@
           <a:p>
             <a:fld id="{3E8CEB70-C80E-1048-86BD-76ABBAA6B3F4}" type="datetimeFigureOut">
               <a:rPr lang="en-US" smtClean="0"/>
-              <a:t>11/13/2014</a:t>
+              <a:t>11/27/2014</a:t>
             </a:fld>
             <a:endParaRPr lang="en-US"/>
           </a:p>
@@ -3934,7 +3925,7 @@
           <a:p>
             <a:fld id="{3E8CEB70-C80E-1048-86BD-76ABBAA6B3F4}" type="datetimeFigureOut">
               <a:rPr lang="en-US" smtClean="0"/>
-              <a:t>11/13/2014</a:t>
+              <a:t>11/27/2014</a:t>
             </a:fld>
             <a:endParaRPr lang="en-US"/>
           </a:p>
@@ -4356,7 +4347,7 @@
           <a:p>
             <a:fld id="{3E8CEB70-C80E-1048-86BD-76ABBAA6B3F4}" type="datetimeFigureOut">
               <a:rPr lang="en-US" smtClean="0"/>
-              <a:t>11/13/2014</a:t>
+              <a:t>11/27/2014</a:t>
             </a:fld>
             <a:endParaRPr lang="en-US"/>
           </a:p>
@@ -4474,7 +4465,7 @@
           <a:p>
             <a:fld id="{3E8CEB70-C80E-1048-86BD-76ABBAA6B3F4}" type="datetimeFigureOut">
               <a:rPr lang="en-US" smtClean="0"/>
-              <a:t>11/13/2014</a:t>
+              <a:t>11/27/2014</a:t>
             </a:fld>
             <a:endParaRPr lang="en-US"/>
           </a:p>
@@ -4569,7 +4560,7 @@
           <a:p>
             <a:fld id="{3E8CEB70-C80E-1048-86BD-76ABBAA6B3F4}" type="datetimeFigureOut">
               <a:rPr lang="en-US" smtClean="0"/>
-              <a:t>11/13/2014</a:t>
+              <a:t>11/27/2014</a:t>
             </a:fld>
             <a:endParaRPr lang="en-US"/>
           </a:p>
@@ -4846,7 +4837,7 @@
           <a:p>
             <a:fld id="{3E8CEB70-C80E-1048-86BD-76ABBAA6B3F4}" type="datetimeFigureOut">
               <a:rPr lang="en-US" smtClean="0"/>
-              <a:t>11/13/2014</a:t>
+              <a:t>11/27/2014</a:t>
             </a:fld>
             <a:endParaRPr lang="en-US"/>
           </a:p>
@@ -5099,7 +5090,7 @@
           <a:p>
             <a:fld id="{3E8CEB70-C80E-1048-86BD-76ABBAA6B3F4}" type="datetimeFigureOut">
               <a:rPr lang="en-US" smtClean="0"/>
-              <a:t>11/13/2014</a:t>
+              <a:t>11/27/2014</a:t>
             </a:fld>
             <a:endParaRPr lang="en-US"/>
           </a:p>
@@ -5312,7 +5303,7 @@
           <a:p>
             <a:fld id="{3E8CEB70-C80E-1048-86BD-76ABBAA6B3F4}" type="datetimeFigureOut">
               <a:rPr lang="en-US" smtClean="0"/>
-              <a:t>11/13/2014</a:t>
+              <a:t>11/27/2014</a:t>
             </a:fld>
             <a:endParaRPr lang="en-US"/>
           </a:p>
@@ -7573,15 +7564,7 @@
             <a:pPr lvl="1"/>
             <a:r>
               <a:rPr lang="en-US" dirty="0" smtClean="0"/>
-              <a:t>Technical Forum meetings (</a:t>
-            </a:r>
-            <a:r>
-              <a:rPr lang="en-US" dirty="0" smtClean="0"/>
-              <a:t>normally 15:00 </a:t>
-            </a:r>
-            <a:r>
-              <a:rPr lang="en-US" dirty="0" smtClean="0"/>
-              <a:t>last Wednesday of month)</a:t>
+              <a:t>Technical Forum meetings (normally 15:00 last Wednesday of month)</a:t>
             </a:r>
           </a:p>
           <a:p>
@@ -7846,13 +7829,8 @@
             </a:r>
             <a:r>
               <a:rPr lang="en-GB" dirty="0" smtClean="0"/>
-              <a:t> January</a:t>
-            </a:r>
-            <a:r>
-              <a:rPr lang="en-GB" dirty="0" smtClean="0"/>
-              <a:t> 2015</a:t>
-            </a:r>
-            <a:endParaRPr lang="en-GB" dirty="0" smtClean="0"/>
+              <a:t> January 2015</a:t>
+            </a:r>
           </a:p>
           <a:p>
             <a:r>
@@ -8184,16 +8162,7 @@
                 </a:solidFill>
                 <a:hlinkClick r:id="rId2"/>
               </a:rPr>
-              <a:t>http://</a:t>
-            </a:r>
-            <a:r>
-              <a:rPr lang="en-GB" altLang="en-US" sz="2300" dirty="0" smtClean="0">
-                <a:solidFill>
-                  <a:srgbClr val="292934"/>
-                </a:solidFill>
-                <a:hlinkClick r:id="rId2"/>
-              </a:rPr>
-              <a:t>software-carpentry.org/workshops</a:t>
+              <a:t>http://software-carpentry.org/workshops</a:t>
             </a:r>
             <a:r>
               <a:rPr lang="en-GB" altLang="en-US" sz="2300" dirty="0" smtClean="0">
@@ -8203,11 +8172,6 @@
               </a:rPr>
               <a:t> </a:t>
             </a:r>
-            <a:endParaRPr lang="en-GB" altLang="en-US" sz="2300" dirty="0" smtClean="0">
-              <a:solidFill>
-                <a:srgbClr val="292934"/>
-              </a:solidFill>
-            </a:endParaRPr>
           </a:p>
           <a:p>
             <a:pPr marL="0" indent="0" algn="ctr" fontAlgn="auto">
@@ -8909,7 +8873,7 @@
         </p:blipFill>
         <p:spPr>
           <a:xfrm>
-            <a:off x="5652120" y="1916832"/>
+            <a:off x="5652120" y="2259744"/>
             <a:ext cx="3370790" cy="4248472"/>
           </a:xfrm>
           <a:prstGeom prst="rect">
@@ -8917,6 +8881,45 @@
           </a:prstGeom>
         </p:spPr>
       </p:pic>
+      <p:sp>
+        <p:nvSpPr>
+          <p:cNvPr id="8" name="TextBox 7"/>
+          <p:cNvSpPr txBox="1"/>
+          <p:nvPr/>
+        </p:nvSpPr>
+        <p:spPr>
+          <a:xfrm>
+            <a:off x="5343024" y="1416354"/>
+            <a:ext cx="3929596" cy="830997"/>
+          </a:xfrm>
+          <a:prstGeom prst="rect">
+            <a:avLst/>
+          </a:prstGeom>
+          <a:noFill/>
+        </p:spPr>
+        <p:txBody>
+          <a:bodyPr wrap="square" rtlCol="0">
+            <a:spAutoFit/>
+          </a:bodyPr>
+          <a:lstStyle/>
+          <a:p>
+            <a:pPr algn="ctr" defTabSz="914400"/>
+            <a:r>
+              <a:rPr lang="en-GB" sz="2400" b="1" dirty="0" smtClean="0">
+                <a:solidFill>
+                  <a:prstClr val="black"/>
+                </a:solidFill>
+              </a:rPr>
+              <a:t>Not broken software broken science but…</a:t>
+            </a:r>
+            <a:endParaRPr lang="en-GB" b="1" dirty="0" smtClean="0">
+              <a:solidFill>
+                <a:prstClr val="black"/>
+              </a:solidFill>
+            </a:endParaRPr>
+          </a:p>
+        </p:txBody>
+      </p:sp>
     </p:spTree>
     <p:extLst>
       <p:ext uri="{BB962C8B-B14F-4D97-AF65-F5344CB8AC3E}">
@@ -8938,9 +8941,125 @@
   <p:timing>
     <p:tnLst>
       <p:par>
-        <p:cTn id="1" dur="indefinite" restart="never" nodeType="tmRoot"/>
+        <p:cTn id="1" dur="indefinite" restart="never" nodeType="tmRoot">
+          <p:childTnLst>
+            <p:seq concurrent="1" nextAc="seek">
+              <p:cTn id="2" dur="indefinite" nodeType="mainSeq">
+                <p:childTnLst>
+                  <p:par>
+                    <p:cTn id="3" fill="hold">
+                      <p:stCondLst>
+                        <p:cond delay="indefinite"/>
+                      </p:stCondLst>
+                      <p:childTnLst>
+                        <p:par>
+                          <p:cTn id="4" fill="hold">
+                            <p:stCondLst>
+                              <p:cond delay="0"/>
+                            </p:stCondLst>
+                            <p:childTnLst>
+                              <p:par>
+                                <p:cTn id="5" presetID="1" presetClass="entr" presetSubtype="0" fill="hold" grpId="0" nodeType="clickEffect">
+                                  <p:stCondLst>
+                                    <p:cond delay="0"/>
+                                  </p:stCondLst>
+                                  <p:childTnLst>
+                                    <p:set>
+                                      <p:cBhvr>
+                                        <p:cTn id="6" dur="1" fill="hold">
+                                          <p:stCondLst>
+                                            <p:cond delay="0"/>
+                                          </p:stCondLst>
+                                        </p:cTn>
+                                        <p:tgtEl>
+                                          <p:spTgt spid="8"/>
+                                        </p:tgtEl>
+                                        <p:attrNameLst>
+                                          <p:attrName>style.visibility</p:attrName>
+                                        </p:attrNameLst>
+                                      </p:cBhvr>
+                                      <p:to>
+                                        <p:strVal val="visible"/>
+                                      </p:to>
+                                    </p:set>
+                                  </p:childTnLst>
+                                </p:cTn>
+                              </p:par>
+                            </p:childTnLst>
+                          </p:cTn>
+                        </p:par>
+                      </p:childTnLst>
+                    </p:cTn>
+                  </p:par>
+                  <p:par>
+                    <p:cTn id="7" fill="hold">
+                      <p:stCondLst>
+                        <p:cond delay="indefinite"/>
+                      </p:stCondLst>
+                      <p:childTnLst>
+                        <p:par>
+                          <p:cTn id="8" fill="hold">
+                            <p:stCondLst>
+                              <p:cond delay="0"/>
+                            </p:stCondLst>
+                            <p:childTnLst>
+                              <p:par>
+                                <p:cTn id="9" presetID="1" presetClass="entr" presetSubtype="0" fill="hold" nodeType="clickEffect">
+                                  <p:stCondLst>
+                                    <p:cond delay="0"/>
+                                  </p:stCondLst>
+                                  <p:childTnLst>
+                                    <p:set>
+                                      <p:cBhvr>
+                                        <p:cTn id="10" dur="1" fill="hold">
+                                          <p:stCondLst>
+                                            <p:cond delay="0"/>
+                                          </p:stCondLst>
+                                        </p:cTn>
+                                        <p:tgtEl>
+                                          <p:spTgt spid="5"/>
+                                        </p:tgtEl>
+                                        <p:attrNameLst>
+                                          <p:attrName>style.visibility</p:attrName>
+                                        </p:attrNameLst>
+                                      </p:cBhvr>
+                                      <p:to>
+                                        <p:strVal val="visible"/>
+                                      </p:to>
+                                    </p:set>
+                                  </p:childTnLst>
+                                </p:cTn>
+                              </p:par>
+                            </p:childTnLst>
+                          </p:cTn>
+                        </p:par>
+                      </p:childTnLst>
+                    </p:cTn>
+                  </p:par>
+                </p:childTnLst>
+              </p:cTn>
+              <p:prevCondLst>
+                <p:cond evt="onPrev" delay="0">
+                  <p:tgtEl>
+                    <p:sldTgt/>
+                  </p:tgtEl>
+                </p:cond>
+              </p:prevCondLst>
+              <p:nextCondLst>
+                <p:cond evt="onNext" delay="0">
+                  <p:tgtEl>
+                    <p:sldTgt/>
+                  </p:tgtEl>
+                </p:cond>
+              </p:nextCondLst>
+            </p:seq>
+          </p:childTnLst>
+        </p:cTn>
       </p:par>
     </p:tnLst>
+    <p:bldLst>
+      <p:bldP spid="8" grpId="0"/>
+    </p:bldLst>
   </p:timing>
 </p:sld>
 </file>
@@ -9550,8 +9669,8 @@
         </p:nvSpPr>
         <p:spPr>
           <a:xfrm>
-            <a:off x="457200" y="1412776"/>
-            <a:ext cx="8229600" cy="4195598"/>
+            <a:off x="457200" y="1412775"/>
+            <a:ext cx="8229600" cy="4364569"/>
           </a:xfrm>
         </p:spPr>
         <p:txBody>
@@ -9560,13 +9679,74 @@
           </a:bodyPr>
           <a:lstStyle/>
           <a:p>
+            <a:pPr marL="0" indent="0" algn="ctr">
+              <a:buNone/>
+            </a:pPr>
+            <a:r>
+              <a:rPr lang="en-GB" sz="1200" dirty="0"/>
+              <a:t>Wilson G, </a:t>
+            </a:r>
+            <a:r>
+              <a:rPr lang="en-GB" sz="1200" dirty="0" err="1"/>
+              <a:t>Aruliah</a:t>
+            </a:r>
+            <a:r>
+              <a:rPr lang="en-GB" sz="1200" dirty="0"/>
+              <a:t> DA, Brown CT, </a:t>
+            </a:r>
+            <a:r>
+              <a:rPr lang="en-GB" sz="1200" dirty="0" err="1"/>
+              <a:t>Chue</a:t>
+            </a:r>
+            <a:r>
+              <a:rPr lang="en-GB" sz="1200" dirty="0"/>
+              <a:t> Hong NP, Davis M, et al. (2014) Best Practices for Scientific Computing. </a:t>
+            </a:r>
+            <a:r>
+              <a:rPr lang="en-GB" sz="1200" dirty="0" err="1"/>
+              <a:t>PLoS</a:t>
+            </a:r>
+            <a:r>
+              <a:rPr lang="en-GB" sz="1200" dirty="0"/>
+              <a:t> </a:t>
+            </a:r>
+            <a:r>
+              <a:rPr lang="en-GB" sz="1200" dirty="0" err="1"/>
+              <a:t>Biol</a:t>
+            </a:r>
+            <a:r>
+              <a:rPr lang="en-GB" sz="1200" dirty="0"/>
+              <a:t> 12(1): e1001745. doi:10.1371/journal.pbio.1001745. </a:t>
+            </a:r>
+            <a:r>
+              <a:rPr lang="en-GB" sz="1200" dirty="0">
+                <a:hlinkClick r:id="rId3"/>
+              </a:rPr>
+              <a:t>http://dx.doi.org/10.1371/journal.pbio.1001745</a:t>
+            </a:r>
+            <a:r>
+              <a:rPr lang="en-GB" sz="1200" dirty="0" smtClean="0"/>
+              <a:t>.</a:t>
+            </a:r>
+          </a:p>
+          <a:p>
+            <a:pPr marL="0" indent="0" algn="ctr">
+              <a:buNone/>
+            </a:pPr>
+            <a:endParaRPr lang="en-GB" sz="1800" dirty="0" smtClean="0"/>
+          </a:p>
+          <a:p>
             <a:pPr marL="457200" indent="-457200">
               <a:buFont typeface="+mj-lt"/>
               <a:buAutoNum type="arabicPeriod"/>
             </a:pPr>
             <a:r>
+              <a:rPr lang="en-GB" dirty="0" smtClean="0"/>
+              <a:t>Write </a:t>
+            </a:r>
+            <a:r>
               <a:rPr lang="en-GB" dirty="0"/>
-              <a:t>Write programs for people, not </a:t>
+              <a:t>programs for people, not </a:t>
             </a:r>
             <a:r>
               <a:rPr lang="en-GB" dirty="0" smtClean="0"/>
@@ -9667,74 +9847,6 @@
               <a:buNone/>
             </a:pPr>
             <a:endParaRPr lang="en-GB" sz="1400" dirty="0" smtClean="0"/>
-          </a:p>
-          <a:p>
-            <a:pPr marL="0" indent="0">
-              <a:buNone/>
-            </a:pPr>
-            <a:r>
-              <a:rPr lang="en-GB" sz="1100" dirty="0"/>
-              <a:t>Wilson G, </a:t>
-            </a:r>
-            <a:r>
-              <a:rPr lang="en-GB" sz="1100" dirty="0" err="1"/>
-              <a:t>Aruliah</a:t>
-            </a:r>
-            <a:r>
-              <a:rPr lang="en-GB" sz="1100" dirty="0"/>
-              <a:t> DA, Brown CT, </a:t>
-            </a:r>
-            <a:r>
-              <a:rPr lang="en-GB" sz="1100" dirty="0" err="1"/>
-              <a:t>Chue</a:t>
-            </a:r>
-            <a:r>
-              <a:rPr lang="en-GB" sz="1100" dirty="0"/>
-              <a:t> Hong NP, Davis M, et al. (2014) Best Practices for Scientific Computing. </a:t>
-            </a:r>
-            <a:r>
-              <a:rPr lang="en-GB" sz="1100" dirty="0" err="1"/>
-              <a:t>PLoS</a:t>
-            </a:r>
-            <a:r>
-              <a:rPr lang="en-GB" sz="1100" dirty="0"/>
-              <a:t> </a:t>
-            </a:r>
-            <a:r>
-              <a:rPr lang="en-GB" sz="1100" dirty="0" err="1"/>
-              <a:t>Biol</a:t>
-            </a:r>
-            <a:r>
-              <a:rPr lang="en-GB" sz="1100" dirty="0"/>
-              <a:t> 12(1): e1001745. </a:t>
-            </a:r>
-            <a:r>
-              <a:rPr lang="en-GB" sz="1100" dirty="0" smtClean="0"/>
-              <a:t>doi:10.1371/journal.pbio.1001745. </a:t>
-            </a:r>
-            <a:r>
-              <a:rPr lang="en-GB" sz="1100" dirty="0" smtClean="0">
-                <a:hlinkClick r:id="rId3"/>
-              </a:rPr>
-              <a:t>http</a:t>
-            </a:r>
-            <a:r>
-              <a:rPr lang="en-GB" sz="1100" dirty="0">
-                <a:hlinkClick r:id="rId3"/>
-              </a:rPr>
-              <a:t>://</a:t>
-            </a:r>
-            <a:r>
-              <a:rPr lang="en-GB" sz="1100" dirty="0" smtClean="0">
-                <a:hlinkClick r:id="rId3"/>
-              </a:rPr>
-              <a:t>dx.doi.org/10.1371/journal.pbio.1001745</a:t>
-            </a:r>
-            <a:r>
-              <a:rPr lang="en-GB" sz="1100" dirty="0" smtClean="0"/>
-              <a:t>. </a:t>
-            </a:r>
-            <a:endParaRPr lang="en-GB" sz="1100" dirty="0"/>
           </a:p>
           <a:p>
             <a:endParaRPr lang="en-GB" dirty="0"/>
@@ -9790,7 +9902,7 @@
                                         <p:tgtEl>
                                           <p:spTgt spid="3">
                                             <p:txEl>
-                                              <p:pRg st="0" end="0"/>
+                                              <p:pRg st="2" end="2"/>
                                             </p:txEl>
                                           </p:spTgt>
                                         </p:tgtEl>
@@ -9821,7 +9933,7 @@
                                         <p:tgtEl>
                                           <p:spTgt spid="3">
                                             <p:txEl>
-                                              <p:pRg st="1" end="1"/>
+                                              <p:pRg st="3" end="3"/>
                                             </p:txEl>
                                           </p:spTgt>
                                         </p:tgtEl>
@@ -9852,7 +9964,7 @@
                                         <p:tgtEl>
                                           <p:spTgt spid="3">
                                             <p:txEl>
-                                              <p:pRg st="2" end="2"/>
+                                              <p:pRg st="4" end="4"/>
                                             </p:txEl>
                                           </p:spTgt>
                                         </p:tgtEl>
@@ -9883,7 +9995,7 @@
                                         <p:tgtEl>
                                           <p:spTgt spid="3">
                                             <p:txEl>
-                                              <p:pRg st="3" end="3"/>
+                                              <p:pRg st="5" end="5"/>
                                             </p:txEl>
                                           </p:spTgt>
                                         </p:tgtEl>
@@ -9932,7 +10044,7 @@
                                         <p:tgtEl>
                                           <p:spTgt spid="3">
                                             <p:txEl>
-                                              <p:pRg st="4" end="4"/>
+                                              <p:pRg st="6" end="6"/>
                                             </p:txEl>
                                           </p:spTgt>
                                         </p:tgtEl>
@@ -9963,7 +10075,7 @@
                                         <p:tgtEl>
                                           <p:spTgt spid="3">
                                             <p:txEl>
-                                              <p:pRg st="5" end="5"/>
+                                              <p:pRg st="7" end="7"/>
                                             </p:txEl>
                                           </p:spTgt>
                                         </p:tgtEl>
@@ -9994,7 +10106,7 @@
                                         <p:tgtEl>
                                           <p:spTgt spid="3">
                                             <p:txEl>
-                                              <p:pRg st="6" end="6"/>
+                                              <p:pRg st="8" end="8"/>
                                             </p:txEl>
                                           </p:spTgt>
                                         </p:tgtEl>
@@ -10025,7 +10137,7 @@
                                         <p:tgtEl>
                                           <p:spTgt spid="3">
                                             <p:txEl>
-                                              <p:pRg st="7" end="7"/>
+                                              <p:pRg st="9" end="9"/>
                                             </p:txEl>
                                           </p:spTgt>
                                         </p:tgtEl>
@@ -10202,11 +10314,7 @@
             </a:r>
             <a:r>
               <a:rPr lang="en-GB" dirty="0" smtClean="0"/>
-              <a:t>others</a:t>
-            </a:r>
-            <a:r>
-              <a:rPr lang="en-GB" dirty="0" smtClean="0"/>
-              <a:t>)</a:t>
+              <a:t>others)</a:t>
             </a:r>
           </a:p>
           <a:p>
@@ -11205,7 +11313,6 @@
               <a:rPr lang="en-GB" dirty="0" smtClean="0"/>
               <a:t>software</a:t>
             </a:r>
-            <a:endParaRPr lang="en-GB" dirty="0" smtClean="0"/>
           </a:p>
           <a:p>
             <a:pPr marL="457200" indent="-457200">
@@ -11250,7 +11357,6 @@
               <a:rPr lang="en-GB" dirty="0" smtClean="0"/>
               <a:t>tool</a:t>
             </a:r>
-            <a:endParaRPr lang="en-GB" dirty="0" smtClean="0"/>
           </a:p>
           <a:p>
             <a:pPr marL="0" indent="0">
@@ -12442,13 +12548,8 @@
             </a:pPr>
             <a:r>
               <a:rPr lang="en-GB" sz="2800" dirty="0" smtClean="0"/>
-              <a:t>What did you think of this </a:t>
-            </a:r>
-            <a:r>
-              <a:rPr lang="en-GB" sz="2800" dirty="0" smtClean="0"/>
-              <a:t>workshop?</a:t>
-            </a:r>
-            <a:endParaRPr lang="en-GB" sz="2800" dirty="0" smtClean="0"/>
+              <a:t>What did you think of this workshop?</a:t>
+            </a:r>
           </a:p>
           <a:p>
             <a:endParaRPr lang="en-GB" sz="2800" dirty="0"/>

</xml_diff>